<commit_message>
unstable version, now using experiment.html file is main, experimentv2 is secondary version
</commit_message>
<xml_diff>
--- a/update10192020.pptx
+++ b/update10192020.pptx
@@ -8,6 +8,7 @@
     <p:sldId id="256" r:id="rId2"/>
     <p:sldId id="257" r:id="rId3"/>
     <p:sldId id="258" r:id="rId4"/>
+    <p:sldId id="259" r:id="rId5"/>
   </p:sldIdLst>
   <p:sldSz cx="12192000" cy="6858000"/>
   <p:notesSz cx="6858000" cy="9144000"/>
@@ -106,6 +107,11 @@
       </a:defRPr>
     </a:lvl9pPr>
   </p:defaultTextStyle>
+  <p:extLst>
+    <p:ext uri="{EFAFB233-063F-42B5-8137-9DF3F51BA10A}">
+      <p15:sldGuideLst xmlns:p15="http://schemas.microsoft.com/office/powerpoint/2012/main"/>
+    </p:ext>
+  </p:extLst>
 </p:presentation>
 </file>
 
@@ -256,7 +262,7 @@
           <a:p>
             <a:fld id="{0A4C9884-A619-4762-A098-987340AB2649}" type="datetimeFigureOut">
               <a:rPr lang="en-US" smtClean="0"/>
-              <a:t>10/19/2020</a:t>
+              <a:t>10/21/2020</a:t>
             </a:fld>
             <a:endParaRPr lang="en-US"/>
           </a:p>
@@ -454,7 +460,7 @@
           <a:p>
             <a:fld id="{0A4C9884-A619-4762-A098-987340AB2649}" type="datetimeFigureOut">
               <a:rPr lang="en-US" smtClean="0"/>
-              <a:t>10/19/2020</a:t>
+              <a:t>10/21/2020</a:t>
             </a:fld>
             <a:endParaRPr lang="en-US"/>
           </a:p>
@@ -662,7 +668,7 @@
           <a:p>
             <a:fld id="{0A4C9884-A619-4762-A098-987340AB2649}" type="datetimeFigureOut">
               <a:rPr lang="en-US" smtClean="0"/>
-              <a:t>10/19/2020</a:t>
+              <a:t>10/21/2020</a:t>
             </a:fld>
             <a:endParaRPr lang="en-US"/>
           </a:p>
@@ -860,7 +866,7 @@
           <a:p>
             <a:fld id="{0A4C9884-A619-4762-A098-987340AB2649}" type="datetimeFigureOut">
               <a:rPr lang="en-US" smtClean="0"/>
-              <a:t>10/19/2020</a:t>
+              <a:t>10/21/2020</a:t>
             </a:fld>
             <a:endParaRPr lang="en-US"/>
           </a:p>
@@ -1135,7 +1141,7 @@
           <a:p>
             <a:fld id="{0A4C9884-A619-4762-A098-987340AB2649}" type="datetimeFigureOut">
               <a:rPr lang="en-US" smtClean="0"/>
-              <a:t>10/19/2020</a:t>
+              <a:t>10/21/2020</a:t>
             </a:fld>
             <a:endParaRPr lang="en-US"/>
           </a:p>
@@ -1400,7 +1406,7 @@
           <a:p>
             <a:fld id="{0A4C9884-A619-4762-A098-987340AB2649}" type="datetimeFigureOut">
               <a:rPr lang="en-US" smtClean="0"/>
-              <a:t>10/19/2020</a:t>
+              <a:t>10/21/2020</a:t>
             </a:fld>
             <a:endParaRPr lang="en-US"/>
           </a:p>
@@ -1812,7 +1818,7 @@
           <a:p>
             <a:fld id="{0A4C9884-A619-4762-A098-987340AB2649}" type="datetimeFigureOut">
               <a:rPr lang="en-US" smtClean="0"/>
-              <a:t>10/19/2020</a:t>
+              <a:t>10/21/2020</a:t>
             </a:fld>
             <a:endParaRPr lang="en-US"/>
           </a:p>
@@ -1953,7 +1959,7 @@
           <a:p>
             <a:fld id="{0A4C9884-A619-4762-A098-987340AB2649}" type="datetimeFigureOut">
               <a:rPr lang="en-US" smtClean="0"/>
-              <a:t>10/19/2020</a:t>
+              <a:t>10/21/2020</a:t>
             </a:fld>
             <a:endParaRPr lang="en-US"/>
           </a:p>
@@ -2066,7 +2072,7 @@
           <a:p>
             <a:fld id="{0A4C9884-A619-4762-A098-987340AB2649}" type="datetimeFigureOut">
               <a:rPr lang="en-US" smtClean="0"/>
-              <a:t>10/19/2020</a:t>
+              <a:t>10/21/2020</a:t>
             </a:fld>
             <a:endParaRPr lang="en-US"/>
           </a:p>
@@ -2377,7 +2383,7 @@
           <a:p>
             <a:fld id="{0A4C9884-A619-4762-A098-987340AB2649}" type="datetimeFigureOut">
               <a:rPr lang="en-US" smtClean="0"/>
-              <a:t>10/19/2020</a:t>
+              <a:t>10/21/2020</a:t>
             </a:fld>
             <a:endParaRPr lang="en-US"/>
           </a:p>
@@ -2665,7 +2671,7 @@
           <a:p>
             <a:fld id="{0A4C9884-A619-4762-A098-987340AB2649}" type="datetimeFigureOut">
               <a:rPr lang="en-US" smtClean="0"/>
-              <a:t>10/19/2020</a:t>
+              <a:t>10/21/2020</a:t>
             </a:fld>
             <a:endParaRPr lang="en-US"/>
           </a:p>
@@ -2906,7 +2912,7 @@
           <a:p>
             <a:fld id="{0A4C9884-A619-4762-A098-987340AB2649}" type="datetimeFigureOut">
               <a:rPr lang="en-US" smtClean="0"/>
-              <a:t>10/19/2020</a:t>
+              <a:t>10/21/2020</a:t>
             </a:fld>
             <a:endParaRPr lang="en-US"/>
           </a:p>
@@ -3406,34 +3412,6 @@
           <a:chExt cx="0" cy="0"/>
         </a:xfrm>
       </p:grpSpPr>
-      <p:sp>
-        <p:nvSpPr>
-          <p:cNvPr id="2" name="Title 1">
-            <a:extLst>
-              <a:ext uri="{FF2B5EF4-FFF2-40B4-BE49-F238E27FC236}">
-                <a16:creationId xmlns:a16="http://schemas.microsoft.com/office/drawing/2014/main" id="{C67ED4C1-FA84-40B8-9F32-DD22493C9FB5}"/>
-              </a:ext>
-            </a:extLst>
-          </p:cNvPr>
-          <p:cNvSpPr>
-            <a:spLocks noGrp="1"/>
-          </p:cNvSpPr>
-          <p:nvPr>
-            <p:ph type="title"/>
-          </p:nvPr>
-        </p:nvSpPr>
-        <p:spPr/>
-        <p:txBody>
-          <a:bodyPr/>
-          <a:lstStyle/>
-          <a:p>
-            <a:r>
-              <a:rPr lang="en-US" dirty="0"/>
-              <a:t>Progress</a:t>
-            </a:r>
-          </a:p>
-        </p:txBody>
-      </p:sp>
       <p:graphicFrame>
         <p:nvGraphicFramePr>
           <p:cNvPr id="4" name="Table 4">
@@ -3449,14 +3427,14 @@
           <p:nvPr>
             <p:extLst>
               <p:ext uri="{D42A27DB-BD31-4B8C-83A1-F6EECF244321}">
-                <p14:modId xmlns:p14="http://schemas.microsoft.com/office/powerpoint/2010/main" val="178309252"/>
+                <p14:modId xmlns:p14="http://schemas.microsoft.com/office/powerpoint/2010/main" val="1144437236"/>
               </p:ext>
             </p:extLst>
           </p:nvPr>
         </p:nvGraphicFramePr>
         <p:xfrm>
-          <a:off x="972506" y="1465545"/>
-          <a:ext cx="10381294" cy="5222240"/>
+          <a:off x="171189" y="475989"/>
+          <a:ext cx="11849622" cy="5318760"/>
         </p:xfrm>
         <a:graphic>
           <a:graphicData uri="http://schemas.openxmlformats.org/drawingml/2006/table">
@@ -3465,14 +3443,14 @@
                 <a:tableStyleId>{5C22544A-7EE6-4342-B048-85BDC9FD1C3A}</a:tableStyleId>
               </a:tblPr>
               <a:tblGrid>
-                <a:gridCol w="1388321">
+                <a:gridCol w="1584685">
                   <a:extLst>
                     <a:ext uri="{9D8B030D-6E8A-4147-A177-3AD203B41FA5}">
                       <a16:colId xmlns:a16="http://schemas.microsoft.com/office/drawing/2014/main" val="1169869543"/>
                     </a:ext>
                   </a:extLst>
                 </a:gridCol>
-                <a:gridCol w="8992973">
+                <a:gridCol w="10264937">
                   <a:extLst>
                     <a:ext uri="{9D8B030D-6E8A-4147-A177-3AD203B41FA5}">
                       <a16:colId xmlns:a16="http://schemas.microsoft.com/office/drawing/2014/main" val="1248521450"/>
@@ -3520,7 +3498,11 @@
                     <a:lstStyle/>
                     <a:p>
                       <a:r>
-                        <a:rPr lang="en-US" dirty="0"/>
+                        <a:rPr lang="en-US" b="1" dirty="0">
+                          <a:solidFill>
+                            <a:srgbClr val="00B050"/>
+                          </a:solidFill>
+                        </a:rPr>
                         <a:t>Done</a:t>
                       </a:r>
                     </a:p>
@@ -3557,7 +3539,11 @@
                     <a:lstStyle/>
                     <a:p>
                       <a:r>
-                        <a:rPr lang="en-US" dirty="0"/>
+                        <a:rPr lang="en-US" b="1" dirty="0">
+                          <a:solidFill>
+                            <a:srgbClr val="00B050"/>
+                          </a:solidFill>
+                        </a:rPr>
                         <a:t>Done</a:t>
                       </a:r>
                     </a:p>
@@ -3614,7 +3600,11 @@
                     <a:lstStyle/>
                     <a:p>
                       <a:r>
-                        <a:rPr lang="en-US" dirty="0"/>
+                        <a:rPr lang="en-US" b="1" dirty="0">
+                          <a:solidFill>
+                            <a:srgbClr val="00B050"/>
+                          </a:solidFill>
+                        </a:rPr>
                         <a:t>Done</a:t>
                       </a:r>
                     </a:p>
@@ -3705,7 +3695,16 @@
                     <a:bodyPr/>
                     <a:lstStyle/>
                     <a:p>
-                      <a:endParaRPr lang="en-US" dirty="0"/>
+                      <a:r>
+                        <a:rPr lang="en-US" b="1" dirty="0">
+                          <a:solidFill>
+                            <a:schemeClr val="accent4">
+                              <a:lumMod val="75000"/>
+                            </a:schemeClr>
+                          </a:solidFill>
+                        </a:rPr>
+                        <a:t>In Progress</a:t>
+                      </a:r>
                     </a:p>
                   </a:txBody>
                   <a:tcPr/>
@@ -3739,7 +3738,58 @@
                     <a:bodyPr/>
                     <a:lstStyle/>
                     <a:p>
-                      <a:endParaRPr lang="en-US" dirty="0"/>
+                      <a:r>
+                        <a:rPr lang="en-US" b="1" dirty="0">
+                          <a:solidFill>
+                            <a:schemeClr val="accent4">
+                              <a:lumMod val="75000"/>
+                            </a:schemeClr>
+                          </a:solidFill>
+                        </a:rPr>
+                        <a:t>In Progress</a:t>
+                      </a:r>
+                    </a:p>
+                  </a:txBody>
+                  <a:tcPr/>
+                </a:tc>
+                <a:tc>
+                  <a:txBody>
+                    <a:bodyPr/>
+                    <a:lstStyle/>
+                    <a:p>
+                      <a:r>
+                        <a:rPr lang="en-US" b="1" i="0" dirty="0"/>
+                        <a:t>CITI Training: </a:t>
+                      </a:r>
+                      <a:r>
+                        <a:rPr lang="en-US" b="0" i="0" dirty="0"/>
+                        <a:t>Finished Responsible Research, working on Human Subject</a:t>
+                      </a:r>
+                      <a:endParaRPr lang="en-US" b="1" i="0" dirty="0"/>
+                    </a:p>
+                  </a:txBody>
+                  <a:tcPr/>
+                </a:tc>
+                <a:extLst>
+                  <a:ext uri="{0D108BD9-81ED-4DB2-BD59-A6C34878D82A}">
+                    <a16:rowId xmlns:a16="http://schemas.microsoft.com/office/drawing/2014/main" val="2968478208"/>
+                  </a:ext>
+                </a:extLst>
+              </a:tr>
+              <a:tr h="370840">
+                <a:tc>
+                  <a:txBody>
+                    <a:bodyPr/>
+                    <a:lstStyle/>
+                    <a:p>
+                      <a:r>
+                        <a:rPr lang="en-US" b="1" dirty="0">
+                          <a:solidFill>
+                            <a:srgbClr val="C00000"/>
+                          </a:solidFill>
+                        </a:rPr>
+                        <a:t>Not Done</a:t>
+                      </a:r>
                     </a:p>
                   </a:txBody>
                   <a:tcPr/>
@@ -3877,10 +3927,40 @@
             </a:r>
           </a:p>
           <a:p>
+            <a:pPr lvl="1"/>
+            <a:r>
+              <a:rPr lang="en-US" b="1" i="0" u="none" strike="noStrike" dirty="0">
+                <a:solidFill>
+                  <a:srgbClr val="335EEA"/>
+                </a:solidFill>
+                <a:effectLst/>
+                <a:latin typeface="HKGroteskPro"/>
+                <a:hlinkClick r:id="rId2"/>
+              </a:rPr>
+              <a:t>https://xcpd63fioy.cognition.run</a:t>
+            </a:r>
+            <a:endParaRPr lang="en-US" dirty="0"/>
+          </a:p>
+          <a:p>
             <a:r>
               <a:rPr lang="en-US" dirty="0"/>
               <a:t>Sample of experiment</a:t>
             </a:r>
+          </a:p>
+          <a:p>
+            <a:pPr lvl="1"/>
+            <a:r>
+              <a:rPr lang="en-US" b="1" i="0" u="none" strike="noStrike" dirty="0">
+                <a:solidFill>
+                  <a:srgbClr val="335EEA"/>
+                </a:solidFill>
+                <a:effectLst/>
+                <a:latin typeface="HKGroteskPro"/>
+                <a:hlinkClick r:id="rId3"/>
+              </a:rPr>
+              <a:t>https://mm69nwfwja.cognition.run</a:t>
+            </a:r>
+            <a:endParaRPr lang="en-US" dirty="0"/>
           </a:p>
         </p:txBody>
       </p:sp>
@@ -3888,6 +3968,126 @@
     <p:extLst>
       <p:ext uri="{BB962C8B-B14F-4D97-AF65-F5344CB8AC3E}">
         <p14:creationId xmlns:p14="http://schemas.microsoft.com/office/powerpoint/2010/main" val="788964849"/>
+      </p:ext>
+    </p:extLst>
+  </p:cSld>
+  <p:clrMapOvr>
+    <a:masterClrMapping/>
+  </p:clrMapOvr>
+</p:sld>
+</file>
+
+<file path=ppt/slides/slide4.xml><?xml version="1.0" encoding="utf-8"?>
+<p:sld xmlns:a="http://schemas.openxmlformats.org/drawingml/2006/main" xmlns:r="http://schemas.openxmlformats.org/officeDocument/2006/relationships" xmlns:p="http://schemas.openxmlformats.org/presentationml/2006/main">
+  <p:cSld>
+    <p:spTree>
+      <p:nvGrpSpPr>
+        <p:cNvPr id="1" name=""/>
+        <p:cNvGrpSpPr/>
+        <p:nvPr/>
+      </p:nvGrpSpPr>
+      <p:grpSpPr>
+        <a:xfrm>
+          <a:off x="0" y="0"/>
+          <a:ext cx="0" cy="0"/>
+          <a:chOff x="0" y="0"/>
+          <a:chExt cx="0" cy="0"/>
+        </a:xfrm>
+      </p:grpSpPr>
+      <p:sp>
+        <p:nvSpPr>
+          <p:cNvPr id="2" name="Title 1">
+            <a:extLst>
+              <a:ext uri="{FF2B5EF4-FFF2-40B4-BE49-F238E27FC236}">
+                <a16:creationId xmlns:a16="http://schemas.microsoft.com/office/drawing/2014/main" id="{94631B0D-20CF-4BA5-8E8C-CC79D541358C}"/>
+              </a:ext>
+            </a:extLst>
+          </p:cNvPr>
+          <p:cNvSpPr>
+            <a:spLocks noGrp="1"/>
+          </p:cNvSpPr>
+          <p:nvPr>
+            <p:ph type="title"/>
+          </p:nvPr>
+        </p:nvSpPr>
+        <p:spPr/>
+        <p:txBody>
+          <a:bodyPr/>
+          <a:lstStyle/>
+          <a:p>
+            <a:r>
+              <a:rPr lang="en-US" dirty="0"/>
+              <a:t>To do </a:t>
+            </a:r>
+          </a:p>
+        </p:txBody>
+      </p:sp>
+      <p:sp>
+        <p:nvSpPr>
+          <p:cNvPr id="3" name="Content Placeholder 2">
+            <a:extLst>
+              <a:ext uri="{FF2B5EF4-FFF2-40B4-BE49-F238E27FC236}">
+                <a16:creationId xmlns:a16="http://schemas.microsoft.com/office/drawing/2014/main" id="{32018004-D32B-4CC3-8638-63AAE1F69FF6}"/>
+              </a:ext>
+            </a:extLst>
+          </p:cNvPr>
+          <p:cNvSpPr>
+            <a:spLocks noGrp="1"/>
+          </p:cNvSpPr>
+          <p:nvPr>
+            <p:ph idx="1"/>
+          </p:nvPr>
+        </p:nvSpPr>
+        <p:spPr/>
+        <p:txBody>
+          <a:bodyPr/>
+          <a:lstStyle/>
+          <a:p>
+            <a:r>
+              <a:rPr lang="en-US" dirty="0"/>
+              <a:t>Black and White Faces – just have the capability</a:t>
+            </a:r>
+          </a:p>
+          <a:p>
+            <a:r>
+              <a:rPr lang="en-US" dirty="0"/>
+              <a:t>Sample without replacement, try to figure out solution</a:t>
+            </a:r>
+          </a:p>
+          <a:p>
+            <a:r>
+              <a:rPr lang="en-US" dirty="0"/>
+              <a:t>Informed Consent Text </a:t>
+            </a:r>
+          </a:p>
+          <a:p>
+            <a:r>
+              <a:rPr lang="en-US" dirty="0"/>
+              <a:t>Instructions </a:t>
+            </a:r>
+          </a:p>
+          <a:p>
+            <a:r>
+              <a:rPr lang="en-US" dirty="0"/>
+              <a:t>Finish CITI training </a:t>
+            </a:r>
+          </a:p>
+          <a:p>
+            <a:r>
+              <a:rPr lang="en-US" dirty="0" err="1"/>
+              <a:t>MTurk</a:t>
+            </a:r>
+            <a:endParaRPr lang="en-US" dirty="0"/>
+          </a:p>
+          <a:p>
+            <a:endParaRPr lang="en-US" dirty="0"/>
+          </a:p>
+        </p:txBody>
+      </p:sp>
+    </p:spTree>
+    <p:extLst>
+      <p:ext uri="{BB962C8B-B14F-4D97-AF65-F5344CB8AC3E}">
+        <p14:creationId xmlns:p14="http://schemas.microsoft.com/office/powerpoint/2010/main" val="4290349240"/>
       </p:ext>
     </p:extLst>
   </p:cSld>

</xml_diff>